<commit_message>
almost done with module01.html
</commit_message>
<xml_diff>
--- a/Slides/Lesson 1.2 The Kinds of Data.pptx
+++ b/Slides/Lesson 1.2 The Kinds of Data.pptx
@@ -5,7 +5,7 @@
     <p:sldMasterId id="2147483648" r:id="rId1"/>
   </p:sldMasterIdLst>
   <p:notesMasterIdLst>
-    <p:notesMasterId r:id="rId15"/>
+    <p:notesMasterId r:id="rId16"/>
   </p:notesMasterIdLst>
   <p:sldIdLst>
     <p:sldId id="257" r:id="rId2"/>
@@ -21,6 +21,7 @@
     <p:sldId id="341" r:id="rId12"/>
     <p:sldId id="342" r:id="rId13"/>
     <p:sldId id="371" r:id="rId14"/>
+    <p:sldId id="372" r:id="rId15"/>
   </p:sldIdLst>
   <p:sldSz cx="9144000" cy="6858000" type="screen4x3"/>
   <p:notesSz cx="6858000" cy="9144000"/>
@@ -137,6 +138,7 @@
             <p14:sldId id="341"/>
             <p14:sldId id="342"/>
             <p14:sldId id="371"/>
+            <p14:sldId id="372"/>
           </p14:sldIdLst>
         </p14:section>
       </p14:sectionLst>
@@ -242,7 +244,7 @@
             <a:fld id="{E3057DDA-BF5C-4879-9957-16E91151DE1E}" type="datetimeFigureOut">
               <a:rPr lang="en-US" smtClean="0"/>
               <a:pPr/>
-              <a:t>8/2/2015</a:t>
+              <a:t>8/11/2015</a:t>
             </a:fld>
             <a:endParaRPr lang="en-US"/>
           </a:p>
@@ -1067,7 +1069,7 @@
           <a:p>
             <a:fld id="{768B3A28-1884-497D-94C5-27227826CE2C}" type="datetime1">
               <a:rPr lang="en-US" smtClean="0"/>
-              <a:t>8/2/2015</a:t>
+              <a:t>8/11/2015</a:t>
             </a:fld>
             <a:endParaRPr lang="en-US"/>
           </a:p>
@@ -1344,7 +1346,7 @@
           <a:p>
             <a:fld id="{B8262C03-9B91-44B2-B7D5-2A844E6680F8}" type="datetime1">
               <a:rPr lang="en-US" smtClean="0"/>
-              <a:t>8/2/2015</a:t>
+              <a:t>8/11/2015</a:t>
             </a:fld>
             <a:endParaRPr lang="en-US"/>
           </a:p>
@@ -1531,7 +1533,7 @@
           <a:p>
             <a:fld id="{B11DCD3A-F44B-4ECF-B365-54BE99BB4BEA}" type="datetime1">
               <a:rPr lang="en-US" smtClean="0"/>
-              <a:t>8/2/2015</a:t>
+              <a:t>8/11/2015</a:t>
             </a:fld>
             <a:endParaRPr lang="en-US"/>
           </a:p>
@@ -1728,7 +1730,7 @@
           <a:p>
             <a:fld id="{94377941-97D9-4840-A51B-C8DAEDA2815C}" type="datetime1">
               <a:rPr lang="en-US" smtClean="0"/>
-              <a:t>8/2/2015</a:t>
+              <a:t>8/11/2015</a:t>
             </a:fld>
             <a:endParaRPr lang="en-US"/>
           </a:p>
@@ -1934,7 +1936,7 @@
           <a:p>
             <a:fld id="{AB7F5B1C-135C-4619-A2DE-25131AF5278A}" type="datetime1">
               <a:rPr lang="en-US" smtClean="0"/>
-              <a:t>8/2/2015</a:t>
+              <a:t>8/11/2015</a:t>
             </a:fld>
             <a:endParaRPr lang="en-US"/>
           </a:p>
@@ -2136,7 +2138,7 @@
           <a:p>
             <a:fld id="{29517BA8-26BA-4B7C-A41A-804B81F83A36}" type="datetime1">
               <a:rPr lang="en-US" smtClean="0"/>
-              <a:t>8/2/2015</a:t>
+              <a:t>8/11/2015</a:t>
             </a:fld>
             <a:endParaRPr lang="en-US"/>
           </a:p>
@@ -2406,7 +2408,7 @@
           <a:p>
             <a:fld id="{E54FABC5-F62F-49DD-A24E-5C2CE15A3D87}" type="datetime1">
               <a:rPr lang="en-US" smtClean="0"/>
-              <a:t>8/2/2015</a:t>
+              <a:t>8/11/2015</a:t>
             </a:fld>
             <a:endParaRPr lang="en-US"/>
           </a:p>
@@ -2718,7 +2720,7 @@
           <a:p>
             <a:fld id="{510AAC56-4986-4B63-9F74-D47EE64ADD9E}" type="datetime1">
               <a:rPr lang="en-US" smtClean="0"/>
-              <a:t>8/2/2015</a:t>
+              <a:t>8/11/2015</a:t>
             </a:fld>
             <a:endParaRPr lang="en-US"/>
           </a:p>
@@ -3164,7 +3166,7 @@
           <a:p>
             <a:fld id="{FCC14660-E407-48B8-9CF0-DD79C3F69AD0}" type="datetime1">
               <a:rPr lang="en-US" smtClean="0"/>
-              <a:t>8/2/2015</a:t>
+              <a:t>8/11/2015</a:t>
             </a:fld>
             <a:endParaRPr lang="en-US"/>
           </a:p>
@@ -3306,7 +3308,7 @@
           <a:p>
             <a:fld id="{9B0DE907-AEDA-4EE9-869A-B21DA6DC498D}" type="datetime1">
               <a:rPr lang="en-US" smtClean="0"/>
-              <a:t>8/2/2015</a:t>
+              <a:t>8/11/2015</a:t>
             </a:fld>
             <a:endParaRPr lang="en-US"/>
           </a:p>
@@ -3418,7 +3420,7 @@
           <a:p>
             <a:fld id="{38C540BA-3DB2-4124-8990-4661E7113E01}" type="datetime1">
               <a:rPr lang="en-US" smtClean="0"/>
-              <a:t>8/2/2015</a:t>
+              <a:t>8/11/2015</a:t>
             </a:fld>
             <a:endParaRPr lang="en-US"/>
           </a:p>
@@ -3712,7 +3714,7 @@
           <a:p>
             <a:fld id="{90F6EF63-9AC7-45BB-B551-A0640428FFFB}" type="datetime1">
               <a:rPr lang="en-US" smtClean="0"/>
-              <a:t>8/2/2015</a:t>
+              <a:t>8/11/2015</a:t>
             </a:fld>
             <a:endParaRPr lang="en-US"/>
           </a:p>
@@ -4419,27 +4421,11 @@
                   <a:srgbClr val="FF0000"/>
                 </a:solidFill>
               </a:rPr>
-              <a:t>Itemization </a:t>
-            </a:r>
-            <a:r>
-              <a:rPr lang="en-US" i="1" dirty="0" smtClean="0">
-                <a:solidFill>
-                  <a:srgbClr val="FF0000"/>
-                </a:solidFill>
-              </a:rPr>
-              <a:t>data </a:t>
+              <a:t>Itemization data </a:t>
             </a:r>
             <a:r>
               <a:rPr lang="en-US" dirty="0" smtClean="0"/>
-              <a:t>is </a:t>
-            </a:r>
-            <a:r>
-              <a:rPr lang="en-US" dirty="0" smtClean="0"/>
-              <a:t>data that takes on one of a few values</a:t>
-            </a:r>
-            <a:r>
-              <a:rPr lang="en-US" dirty="0" smtClean="0"/>
-              <a:t>.</a:t>
+              <a:t>is data that takes on one of a few values.</a:t>
             </a:r>
           </a:p>
           <a:p>
@@ -4447,7 +4433,6 @@
               <a:rPr lang="en-US" dirty="0" smtClean="0"/>
               <a:t>Sometimes this is called “enumeration data.”</a:t>
             </a:r>
-            <a:endParaRPr lang="en-US" dirty="0" smtClean="0"/>
           </a:p>
           <a:p>
             <a:r>
@@ -4562,29 +4547,16 @@
           <a:p>
             <a:r>
               <a:rPr lang="en-US" dirty="0" smtClean="0"/>
-              <a:t>Our last kind of </a:t>
-            </a:r>
-            <a:r>
-              <a:rPr lang="en-US" dirty="0" smtClean="0"/>
-              <a:t>data (for </a:t>
-            </a:r>
-            <a:r>
-              <a:rPr lang="en-US" dirty="0" smtClean="0"/>
-              <a:t>today) is </a:t>
+              <a:t>Our last kind of data (for today) is </a:t>
             </a:r>
             <a:r>
               <a:rPr lang="en-US" i="1" dirty="0" smtClean="0"/>
-              <a:t>mixed </a:t>
-            </a:r>
-            <a:r>
-              <a:rPr lang="en-US" i="1" dirty="0" smtClean="0"/>
-              <a:t>data</a:t>
+              <a:t>mixed data</a:t>
             </a:r>
             <a:r>
               <a:rPr lang="en-US" dirty="0" smtClean="0"/>
               <a:t>. </a:t>
             </a:r>
-            <a:endParaRPr lang="en-US" dirty="0" smtClean="0"/>
           </a:p>
           <a:p>
             <a:r>
@@ -4603,15 +4575,7 @@
                   <a:srgbClr val="FF0000"/>
                 </a:solidFill>
               </a:rPr>
-              <a:t>mixed </a:t>
-            </a:r>
-            <a:r>
-              <a:rPr lang="en-US" i="1" dirty="0" smtClean="0">
-                <a:solidFill>
-                  <a:srgbClr val="FF0000"/>
-                </a:solidFill>
-              </a:rPr>
-              <a:t>data</a:t>
+              <a:t>mixed data</a:t>
             </a:r>
             <a:r>
               <a:rPr lang="en-US" dirty="0" smtClean="0"/>
@@ -5412,6 +5376,132 @@
     <p:extLst>
       <p:ext uri="{BB962C8B-B14F-4D97-AF65-F5344CB8AC3E}">
         <p14:creationId xmlns:p14="http://schemas.microsoft.com/office/powerpoint/2010/main" val="640731812"/>
+      </p:ext>
+    </p:extLst>
+  </p:cSld>
+  <p:clrMapOvr>
+    <a:masterClrMapping/>
+  </p:clrMapOvr>
+  <p:timing>
+    <p:tnLst>
+      <p:par>
+        <p:cTn id="1" dur="indefinite" restart="never" nodeType="tmRoot"/>
+      </p:par>
+    </p:tnLst>
+  </p:timing>
+</p:sld>
+</file>
+
+<file path=ppt/slides/slide14.xml><?xml version="1.0" encoding="utf-8"?>
+<p:sld xmlns:a="http://schemas.openxmlformats.org/drawingml/2006/main" xmlns:r="http://schemas.openxmlformats.org/officeDocument/2006/relationships" xmlns:p="http://schemas.openxmlformats.org/presentationml/2006/main">
+  <p:cSld>
+    <p:spTree>
+      <p:nvGrpSpPr>
+        <p:cNvPr id="1" name=""/>
+        <p:cNvGrpSpPr/>
+        <p:nvPr/>
+      </p:nvGrpSpPr>
+      <p:grpSpPr>
+        <a:xfrm>
+          <a:off x="0" y="0"/>
+          <a:ext cx="0" cy="0"/>
+          <a:chOff x="0" y="0"/>
+          <a:chExt cx="0" cy="0"/>
+        </a:xfrm>
+      </p:grpSpPr>
+      <p:sp>
+        <p:nvSpPr>
+          <p:cNvPr id="2" name="Title 1"/>
+          <p:cNvSpPr>
+            <a:spLocks noGrp="1"/>
+          </p:cNvSpPr>
+          <p:nvPr>
+            <p:ph type="title"/>
+          </p:nvPr>
+        </p:nvSpPr>
+        <p:spPr/>
+        <p:txBody>
+          <a:bodyPr/>
+          <a:lstStyle/>
+          <a:p>
+            <a:r>
+              <a:rPr lang="en-US" dirty="0" smtClean="0"/>
+              <a:t>Next Steps</a:t>
+            </a:r>
+            <a:endParaRPr lang="en-US" dirty="0"/>
+          </a:p>
+        </p:txBody>
+      </p:sp>
+      <p:sp>
+        <p:nvSpPr>
+          <p:cNvPr id="3" name="Content Placeholder 2"/>
+          <p:cNvSpPr>
+            <a:spLocks noGrp="1"/>
+          </p:cNvSpPr>
+          <p:nvPr>
+            <p:ph idx="1"/>
+          </p:nvPr>
+        </p:nvSpPr>
+        <p:spPr/>
+        <p:txBody>
+          <a:bodyPr/>
+          <a:lstStyle/>
+          <a:p>
+            <a:r>
+              <a:rPr lang="en-US" dirty="0" smtClean="0"/>
+              <a:t>Do </a:t>
+            </a:r>
+            <a:r>
+              <a:rPr lang="en-US" smtClean="0"/>
+              <a:t>Guided Practice 1.1</a:t>
+            </a:r>
+          </a:p>
+          <a:p>
+            <a:r>
+              <a:rPr lang="en-US" dirty="0" smtClean="0"/>
+              <a:t>If </a:t>
+            </a:r>
+            <a:r>
+              <a:rPr lang="en-US" dirty="0" smtClean="0"/>
+              <a:t>you have questions about this lesson, ask them on the Discussion Board</a:t>
+            </a:r>
+          </a:p>
+          <a:p>
+            <a:r>
+              <a:rPr lang="en-US" dirty="0" smtClean="0"/>
+              <a:t>Go on to the next lesson</a:t>
+            </a:r>
+            <a:endParaRPr lang="en-US" dirty="0"/>
+          </a:p>
+        </p:txBody>
+      </p:sp>
+      <p:sp>
+        <p:nvSpPr>
+          <p:cNvPr id="4" name="Slide Number Placeholder 3"/>
+          <p:cNvSpPr>
+            <a:spLocks noGrp="1"/>
+          </p:cNvSpPr>
+          <p:nvPr>
+            <p:ph type="sldNum" sz="quarter" idx="12"/>
+          </p:nvPr>
+        </p:nvSpPr>
+        <p:spPr/>
+        <p:txBody>
+          <a:bodyPr/>
+          <a:lstStyle/>
+          <a:p>
+            <a:fld id="{2AF3B5EA-18B6-4040-9F78-6052AF49C681}" type="slidenum">
+              <a:rPr lang="en-US" smtClean="0"/>
+              <a:t>14</a:t>
+            </a:fld>
+            <a:endParaRPr lang="en-US"/>
+          </a:p>
+        </p:txBody>
+      </p:sp>
+    </p:spTree>
+    <p:extLst>
+      <p:ext uri="{BB962C8B-B14F-4D97-AF65-F5344CB8AC3E}">
+        <p14:creationId xmlns:p14="http://schemas.microsoft.com/office/powerpoint/2010/main" val="947348492"/>
       </p:ext>
     </p:extLst>
   </p:cSld>

</xml_diff>